<commit_message>
[OpenMCT] Add support for multiple deployment configurations
* Modify autocoder and build scripts to generate files per
  deployment, instead of simply overwriting them as before

* Add a command line argument to the start script indicating
  which deployment to use

* Add a preprocessing script to start that puts in the correct
  filenames for the current deployment in the config.js file
</commit_message>
<xml_diff>
--- a/openmct/docs/OpenMCTPresentation.pptx
+++ b/openmct/docs/OpenMCTPresentation.pptx
@@ -218,7 +218,7 @@
           <a:p>
             <a:fld id="{9FD36F10-DC57-8844-8384-DAA7EB02B322}" type="datetimeFigureOut">
               <a:rPr lang="en-US" smtClean="0"/>
-              <a:t>7/27/18</a:t>
+              <a:t>7/30/18</a:t>
             </a:fld>
             <a:endParaRPr lang="en-US"/>
           </a:p>
@@ -1596,7 +1596,7 @@
           <a:p>
             <a:fld id="{85791B59-3EF6-3B42-AC9A-A6556B344102}" type="datetime1">
               <a:rPr lang="en-US" smtClean="0"/>
-              <a:t>7/27/18</a:t>
+              <a:t>7/30/18</a:t>
             </a:fld>
             <a:endParaRPr lang="en-US"/>
           </a:p>
@@ -1797,7 +1797,7 @@
           <a:p>
             <a:fld id="{F5EBDD88-02FF-7447-9505-567C5C16BEB5}" type="datetime1">
               <a:rPr lang="en-US" smtClean="0"/>
-              <a:t>7/27/18</a:t>
+              <a:t>7/30/18</a:t>
             </a:fld>
             <a:endParaRPr lang="en-US"/>
           </a:p>
@@ -2008,7 +2008,7 @@
           <a:p>
             <a:fld id="{4C4E920C-ED88-C342-9F35-6267F92EF16B}" type="datetime1">
               <a:rPr lang="en-US" smtClean="0"/>
-              <a:t>7/27/18</a:t>
+              <a:t>7/30/18</a:t>
             </a:fld>
             <a:endParaRPr lang="en-US"/>
           </a:p>
@@ -2209,7 +2209,7 @@
           <a:p>
             <a:fld id="{92716C76-3FDE-174D-AF4C-09A8E99A08FE}" type="datetime1">
               <a:rPr lang="en-US" smtClean="0"/>
-              <a:t>7/27/18</a:t>
+              <a:t>7/30/18</a:t>
             </a:fld>
             <a:endParaRPr lang="en-US"/>
           </a:p>
@@ -2487,7 +2487,7 @@
           <a:p>
             <a:fld id="{F4B4B489-2EB8-4A4E-B26F-B9CC822067B3}" type="datetime1">
               <a:rPr lang="en-US" smtClean="0"/>
-              <a:t>7/27/18</a:t>
+              <a:t>7/30/18</a:t>
             </a:fld>
             <a:endParaRPr lang="en-US"/>
           </a:p>
@@ -2755,7 +2755,7 @@
           <a:p>
             <a:fld id="{1EDD2ACA-C3BA-B545-9F70-1C9D6E6884AF}" type="datetime1">
               <a:rPr lang="en-US" smtClean="0"/>
-              <a:t>7/27/18</a:t>
+              <a:t>7/30/18</a:t>
             </a:fld>
             <a:endParaRPr lang="en-US"/>
           </a:p>
@@ -3170,7 +3170,7 @@
           <a:p>
             <a:fld id="{89DDC001-1DB3-E84E-848D-91B2569F210C}" type="datetime1">
               <a:rPr lang="en-US" smtClean="0"/>
-              <a:t>7/27/18</a:t>
+              <a:t>7/30/18</a:t>
             </a:fld>
             <a:endParaRPr lang="en-US"/>
           </a:p>
@@ -3314,7 +3314,7 @@
           <a:p>
             <a:fld id="{6D6C9A29-3128-034B-A344-89824EB28293}" type="datetime1">
               <a:rPr lang="en-US" smtClean="0"/>
-              <a:t>7/27/18</a:t>
+              <a:t>7/30/18</a:t>
             </a:fld>
             <a:endParaRPr lang="en-US"/>
           </a:p>
@@ -3430,7 +3430,7 @@
           <a:p>
             <a:fld id="{22796B24-2EC2-0E43-A48B-0BBBC79331D5}" type="datetime1">
               <a:rPr lang="en-US" smtClean="0"/>
-              <a:t>7/27/18</a:t>
+              <a:t>7/30/18</a:t>
             </a:fld>
             <a:endParaRPr lang="en-US"/>
           </a:p>
@@ -3744,7 +3744,7 @@
           <a:p>
             <a:fld id="{EF8C412C-D8A2-5144-A60D-C56F18E9EE66}" type="datetime1">
               <a:rPr lang="en-US" smtClean="0"/>
-              <a:t>7/27/18</a:t>
+              <a:t>7/30/18</a:t>
             </a:fld>
             <a:endParaRPr lang="en-US"/>
           </a:p>
@@ -4035,7 +4035,7 @@
           <a:p>
             <a:fld id="{48C4F865-E990-C847-BE8E-1D153C543D73}" type="datetime1">
               <a:rPr lang="en-US" smtClean="0"/>
-              <a:t>7/27/18</a:t>
+              <a:t>7/30/18</a:t>
             </a:fld>
             <a:endParaRPr lang="en-US"/>
           </a:p>
@@ -4279,7 +4279,7 @@
           <a:p>
             <a:fld id="{2D09EC2D-1DAE-B04E-9264-F61DD7B0F992}" type="datetime1">
               <a:rPr lang="en-US" smtClean="0"/>
-              <a:t>7/27/18</a:t>
+              <a:t>7/30/18</a:t>
             </a:fld>
             <a:endParaRPr lang="en-US"/>
           </a:p>
@@ -6055,7 +6055,7 @@
             </a:r>
             <a:r>
               <a:rPr lang="en-US" dirty="0"/>
-              <a:t> Application</a:t>
+              <a:t> Target</a:t>
             </a:r>
           </a:p>
         </p:txBody>
@@ -6130,6 +6130,11 @@
           <a:prstGeom prst="rect">
             <a:avLst/>
           </a:prstGeom>
+          <a:solidFill>
+            <a:schemeClr val="accent6">
+              <a:lumMod val="75000"/>
+            </a:schemeClr>
+          </a:solidFill>
         </p:spPr>
         <p:style>
           <a:lnRef idx="2">
@@ -6184,7 +6189,9 @@
             <a:avLst/>
           </a:prstGeom>
           <a:solidFill>
-            <a:schemeClr val="tx2"/>
+            <a:schemeClr val="accent6">
+              <a:lumMod val="50000"/>
+            </a:schemeClr>
           </a:solidFill>
         </p:spPr>
         <p:style>
@@ -6434,6 +6441,9 @@
           <a:prstGeom prst="rect">
             <a:avLst/>
           </a:prstGeom>
+          <a:solidFill>
+            <a:schemeClr val="tx2"/>
+          </a:solidFill>
         </p:spPr>
         <p:style>
           <a:lnRef idx="2">
@@ -6518,6 +6528,9 @@
           <a:prstGeom prst="rect">
             <a:avLst/>
           </a:prstGeom>
+          <a:solidFill>
+            <a:schemeClr val="tx2"/>
+          </a:solidFill>
         </p:spPr>
         <p:style>
           <a:lnRef idx="2">

</xml_diff>